<commit_message>
2018-01-09, after meeting Andre
</commit_message>
<xml_diff>
--- a/doc/tex/lib/fork/figures/fork.pptx
+++ b/doc/tex/lib/fork/figures/fork.pptx
@@ -243,7 +243,7 @@
           <a:p>
             <a:fld id="{D49AAB4C-DF2E-47F4-BB84-4452C8A70CAB}" type="datetimeFigureOut">
               <a:rPr lang="pt-PT" smtClean="0"/>
-              <a:t>29/11/2017</a:t>
+              <a:t>06/12/2017</a:t>
             </a:fld>
             <a:endParaRPr lang="pt-PT"/>
           </a:p>
@@ -413,7 +413,7 @@
           <a:p>
             <a:fld id="{D49AAB4C-DF2E-47F4-BB84-4452C8A70CAB}" type="datetimeFigureOut">
               <a:rPr lang="pt-PT" smtClean="0"/>
-              <a:t>29/11/2017</a:t>
+              <a:t>06/12/2017</a:t>
             </a:fld>
             <a:endParaRPr lang="pt-PT"/>
           </a:p>
@@ -593,7 +593,7 @@
           <a:p>
             <a:fld id="{D49AAB4C-DF2E-47F4-BB84-4452C8A70CAB}" type="datetimeFigureOut">
               <a:rPr lang="pt-PT" smtClean="0"/>
-              <a:t>29/11/2017</a:t>
+              <a:t>06/12/2017</a:t>
             </a:fld>
             <a:endParaRPr lang="pt-PT"/>
           </a:p>
@@ -763,7 +763,7 @@
           <a:p>
             <a:fld id="{D49AAB4C-DF2E-47F4-BB84-4452C8A70CAB}" type="datetimeFigureOut">
               <a:rPr lang="pt-PT" smtClean="0"/>
-              <a:t>29/11/2017</a:t>
+              <a:t>06/12/2017</a:t>
             </a:fld>
             <a:endParaRPr lang="pt-PT"/>
           </a:p>
@@ -1009,7 +1009,7 @@
           <a:p>
             <a:fld id="{D49AAB4C-DF2E-47F4-BB84-4452C8A70CAB}" type="datetimeFigureOut">
               <a:rPr lang="pt-PT" smtClean="0"/>
-              <a:t>29/11/2017</a:t>
+              <a:t>06/12/2017</a:t>
             </a:fld>
             <a:endParaRPr lang="pt-PT"/>
           </a:p>
@@ -1241,7 +1241,7 @@
           <a:p>
             <a:fld id="{D49AAB4C-DF2E-47F4-BB84-4452C8A70CAB}" type="datetimeFigureOut">
               <a:rPr lang="pt-PT" smtClean="0"/>
-              <a:t>29/11/2017</a:t>
+              <a:t>06/12/2017</a:t>
             </a:fld>
             <a:endParaRPr lang="pt-PT"/>
           </a:p>
@@ -1608,7 +1608,7 @@
           <a:p>
             <a:fld id="{D49AAB4C-DF2E-47F4-BB84-4452C8A70CAB}" type="datetimeFigureOut">
               <a:rPr lang="pt-PT" smtClean="0"/>
-              <a:t>29/11/2017</a:t>
+              <a:t>06/12/2017</a:t>
             </a:fld>
             <a:endParaRPr lang="pt-PT"/>
           </a:p>
@@ -1726,7 +1726,7 @@
           <a:p>
             <a:fld id="{D49AAB4C-DF2E-47F4-BB84-4452C8A70CAB}" type="datetimeFigureOut">
               <a:rPr lang="pt-PT" smtClean="0"/>
-              <a:t>29/11/2017</a:t>
+              <a:t>06/12/2017</a:t>
             </a:fld>
             <a:endParaRPr lang="pt-PT"/>
           </a:p>
@@ -1821,7 +1821,7 @@
           <a:p>
             <a:fld id="{D49AAB4C-DF2E-47F4-BB84-4452C8A70CAB}" type="datetimeFigureOut">
               <a:rPr lang="pt-PT" smtClean="0"/>
-              <a:t>29/11/2017</a:t>
+              <a:t>06/12/2017</a:t>
             </a:fld>
             <a:endParaRPr lang="pt-PT"/>
           </a:p>
@@ -2098,7 +2098,7 @@
           <a:p>
             <a:fld id="{D49AAB4C-DF2E-47F4-BB84-4452C8A70CAB}" type="datetimeFigureOut">
               <a:rPr lang="pt-PT" smtClean="0"/>
-              <a:t>29/11/2017</a:t>
+              <a:t>06/12/2017</a:t>
             </a:fld>
             <a:endParaRPr lang="pt-PT"/>
           </a:p>
@@ -2351,7 +2351,7 @@
           <a:p>
             <a:fld id="{D49AAB4C-DF2E-47F4-BB84-4452C8A70CAB}" type="datetimeFigureOut">
               <a:rPr lang="pt-PT" smtClean="0"/>
-              <a:t>29/11/2017</a:t>
+              <a:t>06/12/2017</a:t>
             </a:fld>
             <a:endParaRPr lang="pt-PT"/>
           </a:p>
@@ -2564,7 +2564,7 @@
           <a:p>
             <a:fld id="{D49AAB4C-DF2E-47F4-BB84-4452C8A70CAB}" type="datetimeFigureOut">
               <a:rPr lang="pt-PT" smtClean="0"/>
-              <a:t>29/11/2017</a:t>
+              <a:t>06/12/2017</a:t>
             </a:fld>
             <a:endParaRPr lang="pt-PT"/>
           </a:p>
@@ -2977,10 +2977,10 @@
         </p:nvGrpSpPr>
         <p:grpSpPr>
           <a:xfrm>
-            <a:off x="1765173" y="974222"/>
-            <a:ext cx="8291078" cy="4452358"/>
-            <a:chOff x="2394673" y="1968488"/>
-            <a:chExt cx="6978107" cy="2401369"/>
+            <a:off x="2083233" y="974222"/>
+            <a:ext cx="7973018" cy="4452358"/>
+            <a:chOff x="2662365" y="1968488"/>
+            <a:chExt cx="6710415" cy="2401369"/>
           </a:xfrm>
         </p:grpSpPr>
         <p:cxnSp>
@@ -3018,93 +3018,6 @@
             </a:fontRef>
           </p:style>
         </p:cxnSp>
-        <mc:AlternateContent xmlns:mc="http://schemas.openxmlformats.org/markup-compatibility/2006">
-          <mc:Choice xmlns:a14="http://schemas.microsoft.com/office/drawing/2010/main" Requires="a14">
-            <p:sp>
-              <p:nvSpPr>
-                <p:cNvPr id="7" name="TextBox 6"/>
-                <p:cNvSpPr txBox="1"/>
-                <p:nvPr/>
-              </p:nvSpPr>
-              <p:spPr>
-                <a:xfrm>
-                  <a:off x="2394673" y="2961672"/>
-                  <a:ext cx="265315" cy="348597"/>
-                </a:xfrm>
-                <a:prstGeom prst="rect">
-                  <a:avLst/>
-                </a:prstGeom>
-                <a:noFill/>
-              </p:spPr>
-              <p:txBody>
-                <a:bodyPr wrap="square" lIns="0" tIns="0" rIns="0" bIns="0" rtlCol="0">
-                  <a:spAutoFit/>
-                </a:bodyPr>
-                <a:lstStyle/>
-                <a:p>
-                  <a:pPr/>
-                  <a14:m>
-                    <m:oMathPara xmlns:m="http://schemas.openxmlformats.org/officeDocument/2006/math">
-                      <m:oMathParaPr>
-                        <m:jc m:val="centerGroup"/>
-                      </m:oMathParaPr>
-                      <m:oMath xmlns:m="http://schemas.openxmlformats.org/officeDocument/2006/math">
-                        <m:r>
-                          <m:rPr>
-                            <m:sty m:val="p"/>
-                          </m:rPr>
-                          <a:rPr lang="en-US" sz="4200" b="0" i="0" smtClean="0">
-                            <a:latin typeface="Cambria Math" panose="02040503050406030204" pitchFamily="18" charset="0"/>
-                          </a:rPr>
-                          <m:t>x</m:t>
-                        </m:r>
-                      </m:oMath>
-                    </m:oMathPara>
-                  </a14:m>
-                  <a:endParaRPr lang="pt-PT" sz="4200" dirty="0"/>
-                </a:p>
-              </p:txBody>
-            </p:sp>
-          </mc:Choice>
-          <mc:Fallback>
-            <p:sp>
-              <p:nvSpPr>
-                <p:cNvPr id="7" name="TextBox 6"/>
-                <p:cNvSpPr txBox="1">
-                  <a:spLocks noRot="1" noChangeAspect="1" noMove="1" noResize="1" noEditPoints="1" noAdjustHandles="1" noChangeArrowheads="1" noChangeShapeType="1" noTextEdit="1"/>
-                </p:cNvSpPr>
-                <p:nvPr/>
-              </p:nvSpPr>
-              <p:spPr>
-                <a:xfrm>
-                  <a:off x="2394673" y="2961672"/>
-                  <a:ext cx="265315" cy="348597"/>
-                </a:xfrm>
-                <a:prstGeom prst="rect">
-                  <a:avLst/>
-                </a:prstGeom>
-                <a:blipFill>
-                  <a:blip r:embed="rId2"/>
-                  <a:stretch>
-                    <a:fillRect/>
-                  </a:stretch>
-                </a:blipFill>
-              </p:spPr>
-              <p:txBody>
-                <a:bodyPr/>
-                <a:lstStyle/>
-                <a:p>
-                  <a:r>
-                    <a:rPr lang="en-US">
-                      <a:noFill/>
-                    </a:rPr>
-                    <a:t> </a:t>
-                  </a:r>
-                </a:p>
-              </p:txBody>
-            </p:sp>
-          </mc:Fallback>
-        </mc:AlternateContent>
         <p:cxnSp>
           <p:nvCxnSpPr>
             <p:cNvPr id="28" name="Straight Arrow Connector 27"/>
@@ -3160,7 +3073,6 @@
             </a:bodyPr>
             <a:lstStyle/>
             <a:p>
-              <a:pPr/>
               <a:endParaRPr lang="pt-PT" sz="3000" dirty="0"/>
             </a:p>
           </p:txBody>
@@ -3577,180 +3489,6 @@
           </p:sp>
         </mc:Fallback>
       </mc:AlternateContent>
-      <mc:AlternateContent xmlns:mc="http://schemas.openxmlformats.org/markup-compatibility/2006">
-        <mc:Choice xmlns:a14="http://schemas.microsoft.com/office/drawing/2010/main" Requires="a14">
-          <p:sp>
-            <p:nvSpPr>
-              <p:cNvPr id="18" name="TextBox 17"/>
-              <p:cNvSpPr txBox="1"/>
-              <p:nvPr/>
-            </p:nvSpPr>
-            <p:spPr>
-              <a:xfrm>
-                <a:off x="10007806" y="1722839"/>
-                <a:ext cx="315236" cy="646331"/>
-              </a:xfrm>
-              <a:prstGeom prst="rect">
-                <a:avLst/>
-              </a:prstGeom>
-              <a:noFill/>
-            </p:spPr>
-            <p:txBody>
-              <a:bodyPr wrap="square" lIns="0" tIns="0" rIns="0" bIns="0" rtlCol="0">
-                <a:spAutoFit/>
-              </a:bodyPr>
-              <a:lstStyle/>
-              <a:p>
-                <a:pPr/>
-                <a14:m>
-                  <m:oMathPara xmlns:m="http://schemas.openxmlformats.org/officeDocument/2006/math">
-                    <m:oMathParaPr>
-                      <m:jc m:val="centerGroup"/>
-                    </m:oMathParaPr>
-                    <m:oMath xmlns:m="http://schemas.openxmlformats.org/officeDocument/2006/math">
-                      <m:r>
-                        <m:rPr>
-                          <m:sty m:val="p"/>
-                        </m:rPr>
-                        <a:rPr lang="en-US" sz="4200" b="0" i="0" smtClean="0">
-                          <a:latin typeface="Cambria Math" panose="02040503050406030204" pitchFamily="18" charset="0"/>
-                        </a:rPr>
-                        <m:t>x</m:t>
-                      </m:r>
-                    </m:oMath>
-                  </m:oMathPara>
-                </a14:m>
-                <a:endParaRPr lang="pt-PT" sz="4200" dirty="0"/>
-              </a:p>
-            </p:txBody>
-          </p:sp>
-        </mc:Choice>
-        <mc:Fallback>
-          <p:sp>
-            <p:nvSpPr>
-              <p:cNvPr id="18" name="TextBox 17"/>
-              <p:cNvSpPr txBox="1">
-                <a:spLocks noRot="1" noChangeAspect="1" noMove="1" noResize="1" noEditPoints="1" noAdjustHandles="1" noChangeArrowheads="1" noChangeShapeType="1" noTextEdit="1"/>
-              </p:cNvSpPr>
-              <p:nvPr/>
-            </p:nvSpPr>
-            <p:spPr>
-              <a:xfrm>
-                <a:off x="10007806" y="1722839"/>
-                <a:ext cx="315236" cy="646331"/>
-              </a:xfrm>
-              <a:prstGeom prst="rect">
-                <a:avLst/>
-              </a:prstGeom>
-              <a:blipFill>
-                <a:blip r:embed="rId9"/>
-                <a:stretch>
-                  <a:fillRect/>
-                </a:stretch>
-              </a:blipFill>
-            </p:spPr>
-            <p:txBody>
-              <a:bodyPr/>
-              <a:lstStyle/>
-              <a:p>
-                <a:r>
-                  <a:rPr lang="en-US">
-                    <a:noFill/>
-                  </a:rPr>
-                  <a:t> </a:t>
-                </a:r>
-              </a:p>
-            </p:txBody>
-          </p:sp>
-        </mc:Fallback>
-      </mc:AlternateContent>
-      <mc:AlternateContent xmlns:mc="http://schemas.openxmlformats.org/markup-compatibility/2006">
-        <mc:Choice xmlns:a14="http://schemas.microsoft.com/office/drawing/2010/main" Requires="a14">
-          <p:sp>
-            <p:nvSpPr>
-              <p:cNvPr id="19" name="TextBox 18"/>
-              <p:cNvSpPr txBox="1"/>
-              <p:nvPr/>
-            </p:nvSpPr>
-            <p:spPr>
-              <a:xfrm>
-                <a:off x="10007806" y="4066376"/>
-                <a:ext cx="315236" cy="646331"/>
-              </a:xfrm>
-              <a:prstGeom prst="rect">
-                <a:avLst/>
-              </a:prstGeom>
-              <a:noFill/>
-            </p:spPr>
-            <p:txBody>
-              <a:bodyPr wrap="square" lIns="0" tIns="0" rIns="0" bIns="0" rtlCol="0">
-                <a:spAutoFit/>
-              </a:bodyPr>
-              <a:lstStyle/>
-              <a:p>
-                <a:pPr/>
-                <a14:m>
-                  <m:oMathPara xmlns:m="http://schemas.openxmlformats.org/officeDocument/2006/math">
-                    <m:oMathParaPr>
-                      <m:jc m:val="centerGroup"/>
-                    </m:oMathParaPr>
-                    <m:oMath xmlns:m="http://schemas.openxmlformats.org/officeDocument/2006/math">
-                      <m:r>
-                        <m:rPr>
-                          <m:sty m:val="p"/>
-                        </m:rPr>
-                        <a:rPr lang="en-US" sz="4200" b="0" i="0" smtClean="0">
-                          <a:latin typeface="Cambria Math" panose="02040503050406030204" pitchFamily="18" charset="0"/>
-                        </a:rPr>
-                        <m:t>x</m:t>
-                      </m:r>
-                    </m:oMath>
-                  </m:oMathPara>
-                </a14:m>
-                <a:endParaRPr lang="pt-PT" sz="4200" dirty="0"/>
-              </a:p>
-            </p:txBody>
-          </p:sp>
-        </mc:Choice>
-        <mc:Fallback>
-          <p:sp>
-            <p:nvSpPr>
-              <p:cNvPr id="19" name="TextBox 18"/>
-              <p:cNvSpPr txBox="1">
-                <a:spLocks noRot="1" noChangeAspect="1" noMove="1" noResize="1" noEditPoints="1" noAdjustHandles="1" noChangeArrowheads="1" noChangeShapeType="1" noTextEdit="1"/>
-              </p:cNvSpPr>
-              <p:nvPr/>
-            </p:nvSpPr>
-            <p:spPr>
-              <a:xfrm>
-                <a:off x="10007806" y="4066376"/>
-                <a:ext cx="315236" cy="646331"/>
-              </a:xfrm>
-              <a:prstGeom prst="rect">
-                <a:avLst/>
-              </a:prstGeom>
-              <a:blipFill>
-                <a:blip r:embed="rId10"/>
-                <a:stretch>
-                  <a:fillRect/>
-                </a:stretch>
-              </a:blipFill>
-            </p:spPr>
-            <p:txBody>
-              <a:bodyPr/>
-              <a:lstStyle/>
-              <a:p>
-                <a:r>
-                  <a:rPr lang="en-US">
-                    <a:noFill/>
-                  </a:rPr>
-                  <a:t> </a:t>
-                </a:r>
-              </a:p>
-            </p:txBody>
-          </p:sp>
-        </mc:Fallback>
-      </mc:AlternateContent>
     </p:spTree>
     <p:extLst>
       <p:ext uri="{BB962C8B-B14F-4D97-AF65-F5344CB8AC3E}">

</xml_diff>

<commit_message>
2018, after meeting Andoni
</commit_message>
<xml_diff>
--- a/doc/tex/lib/fork/figures/fork.pptx
+++ b/doc/tex/lib/fork/figures/fork.pptx
@@ -243,7 +243,7 @@
           <a:p>
             <a:fld id="{D49AAB4C-DF2E-47F4-BB84-4452C8A70CAB}" type="datetimeFigureOut">
               <a:rPr lang="pt-PT" smtClean="0"/>
-              <a:t>06/12/2017</a:t>
+              <a:t>08/01/2018</a:t>
             </a:fld>
             <a:endParaRPr lang="pt-PT"/>
           </a:p>
@@ -413,7 +413,7 @@
           <a:p>
             <a:fld id="{D49AAB4C-DF2E-47F4-BB84-4452C8A70CAB}" type="datetimeFigureOut">
               <a:rPr lang="pt-PT" smtClean="0"/>
-              <a:t>06/12/2017</a:t>
+              <a:t>08/01/2018</a:t>
             </a:fld>
             <a:endParaRPr lang="pt-PT"/>
           </a:p>
@@ -593,7 +593,7 @@
           <a:p>
             <a:fld id="{D49AAB4C-DF2E-47F4-BB84-4452C8A70CAB}" type="datetimeFigureOut">
               <a:rPr lang="pt-PT" smtClean="0"/>
-              <a:t>06/12/2017</a:t>
+              <a:t>08/01/2018</a:t>
             </a:fld>
             <a:endParaRPr lang="pt-PT"/>
           </a:p>
@@ -763,7 +763,7 @@
           <a:p>
             <a:fld id="{D49AAB4C-DF2E-47F4-BB84-4452C8A70CAB}" type="datetimeFigureOut">
               <a:rPr lang="pt-PT" smtClean="0"/>
-              <a:t>06/12/2017</a:t>
+              <a:t>08/01/2018</a:t>
             </a:fld>
             <a:endParaRPr lang="pt-PT"/>
           </a:p>
@@ -1009,7 +1009,7 @@
           <a:p>
             <a:fld id="{D49AAB4C-DF2E-47F4-BB84-4452C8A70CAB}" type="datetimeFigureOut">
               <a:rPr lang="pt-PT" smtClean="0"/>
-              <a:t>06/12/2017</a:t>
+              <a:t>08/01/2018</a:t>
             </a:fld>
             <a:endParaRPr lang="pt-PT"/>
           </a:p>
@@ -1241,7 +1241,7 @@
           <a:p>
             <a:fld id="{D49AAB4C-DF2E-47F4-BB84-4452C8A70CAB}" type="datetimeFigureOut">
               <a:rPr lang="pt-PT" smtClean="0"/>
-              <a:t>06/12/2017</a:t>
+              <a:t>08/01/2018</a:t>
             </a:fld>
             <a:endParaRPr lang="pt-PT"/>
           </a:p>
@@ -1608,7 +1608,7 @@
           <a:p>
             <a:fld id="{D49AAB4C-DF2E-47F4-BB84-4452C8A70CAB}" type="datetimeFigureOut">
               <a:rPr lang="pt-PT" smtClean="0"/>
-              <a:t>06/12/2017</a:t>
+              <a:t>08/01/2018</a:t>
             </a:fld>
             <a:endParaRPr lang="pt-PT"/>
           </a:p>
@@ -1726,7 +1726,7 @@
           <a:p>
             <a:fld id="{D49AAB4C-DF2E-47F4-BB84-4452C8A70CAB}" type="datetimeFigureOut">
               <a:rPr lang="pt-PT" smtClean="0"/>
-              <a:t>06/12/2017</a:t>
+              <a:t>08/01/2018</a:t>
             </a:fld>
             <a:endParaRPr lang="pt-PT"/>
           </a:p>
@@ -1821,7 +1821,7 @@
           <a:p>
             <a:fld id="{D49AAB4C-DF2E-47F4-BB84-4452C8A70CAB}" type="datetimeFigureOut">
               <a:rPr lang="pt-PT" smtClean="0"/>
-              <a:t>06/12/2017</a:t>
+              <a:t>08/01/2018</a:t>
             </a:fld>
             <a:endParaRPr lang="pt-PT"/>
           </a:p>
@@ -2098,7 +2098,7 @@
           <a:p>
             <a:fld id="{D49AAB4C-DF2E-47F4-BB84-4452C8A70CAB}" type="datetimeFigureOut">
               <a:rPr lang="pt-PT" smtClean="0"/>
-              <a:t>06/12/2017</a:t>
+              <a:t>08/01/2018</a:t>
             </a:fld>
             <a:endParaRPr lang="pt-PT"/>
           </a:p>
@@ -2351,7 +2351,7 @@
           <a:p>
             <a:fld id="{D49AAB4C-DF2E-47F4-BB84-4452C8A70CAB}" type="datetimeFigureOut">
               <a:rPr lang="pt-PT" smtClean="0"/>
-              <a:t>06/12/2017</a:t>
+              <a:t>08/01/2018</a:t>
             </a:fld>
             <a:endParaRPr lang="pt-PT"/>
           </a:p>
@@ -2564,7 +2564,7 @@
           <a:p>
             <a:fld id="{D49AAB4C-DF2E-47F4-BB84-4452C8A70CAB}" type="datetimeFigureOut">
               <a:rPr lang="pt-PT" smtClean="0"/>
-              <a:t>06/12/2017</a:t>
+              <a:t>08/01/2018</a:t>
             </a:fld>
             <a:endParaRPr lang="pt-PT"/>
           </a:p>
@@ -3489,6 +3489,318 @@
           </p:sp>
         </mc:Fallback>
       </mc:AlternateContent>
+      <mc:AlternateContent xmlns:mc="http://schemas.openxmlformats.org/markup-compatibility/2006">
+        <mc:Choice xmlns:a14="http://schemas.microsoft.com/office/drawing/2010/main" Requires="a14">
+          <p:sp>
+            <p:nvSpPr>
+              <p:cNvPr id="6" name="TextBox 5"/>
+              <p:cNvSpPr txBox="1"/>
+              <p:nvPr/>
+            </p:nvSpPr>
+            <p:spPr>
+              <a:xfrm>
+                <a:off x="1583031" y="2938788"/>
+                <a:ext cx="500202" cy="523220"/>
+              </a:xfrm>
+              <a:prstGeom prst="rect">
+                <a:avLst/>
+              </a:prstGeom>
+              <a:noFill/>
+            </p:spPr>
+            <p:txBody>
+              <a:bodyPr wrap="none" lIns="0" tIns="0" rIns="0" bIns="0" rtlCol="0">
+                <a:spAutoFit/>
+              </a:bodyPr>
+              <a:lstStyle/>
+              <a:p>
+                <a14:m>
+                  <m:oMathPara xmlns:m="http://schemas.openxmlformats.org/officeDocument/2006/math">
+                    <m:oMathParaPr>
+                      <m:jc m:val="centerGroup"/>
+                    </m:oMathParaPr>
+                    <m:oMath xmlns:m="http://schemas.openxmlformats.org/officeDocument/2006/math">
+                      <m:sSub>
+                        <m:sSubPr>
+                          <m:ctrlPr>
+                            <a:rPr lang="en-US" sz="3400">
+                              <a:latin typeface="Cambria Math" panose="02040503050406030204" pitchFamily="18" charset="0"/>
+                            </a:rPr>
+                          </m:ctrlPr>
+                        </m:sSubPr>
+                        <m:e>
+                          <m:r>
+                            <a:rPr lang="en-US" sz="3400">
+                              <a:latin typeface="Cambria Math" panose="02040503050406030204" pitchFamily="18" charset="0"/>
+                            </a:rPr>
+                            <m:t>𝑆</m:t>
+                          </m:r>
+                        </m:e>
+                        <m:sub>
+                          <m:r>
+                            <a:rPr lang="en-US" sz="3400">
+                              <a:latin typeface="Cambria Math" panose="02040503050406030204" pitchFamily="18" charset="0"/>
+                            </a:rPr>
+                            <m:t>1</m:t>
+                          </m:r>
+                        </m:sub>
+                      </m:sSub>
+                    </m:oMath>
+                  </m:oMathPara>
+                </a14:m>
+                <a:endParaRPr lang="en-US" sz="3400" dirty="0">
+                  <a:latin typeface="Cambria Math" panose="02040503050406030204" pitchFamily="18" charset="0"/>
+                </a:endParaRPr>
+              </a:p>
+            </p:txBody>
+          </p:sp>
+        </mc:Choice>
+        <mc:Fallback>
+          <p:sp>
+            <p:nvSpPr>
+              <p:cNvPr id="6" name="TextBox 5"/>
+              <p:cNvSpPr txBox="1">
+                <a:spLocks noRot="1" noChangeAspect="1" noMove="1" noResize="1" noEditPoints="1" noAdjustHandles="1" noChangeArrowheads="1" noChangeShapeType="1" noTextEdit="1"/>
+              </p:cNvSpPr>
+              <p:nvPr/>
+            </p:nvSpPr>
+            <p:spPr>
+              <a:xfrm>
+                <a:off x="1583031" y="2938788"/>
+                <a:ext cx="500202" cy="523220"/>
+              </a:xfrm>
+              <a:prstGeom prst="rect">
+                <a:avLst/>
+              </a:prstGeom>
+              <a:blipFill>
+                <a:blip r:embed="rId9"/>
+                <a:stretch>
+                  <a:fillRect/>
+                </a:stretch>
+              </a:blipFill>
+            </p:spPr>
+            <p:txBody>
+              <a:bodyPr/>
+              <a:lstStyle/>
+              <a:p>
+                <a:r>
+                  <a:rPr lang="en-US">
+                    <a:noFill/>
+                  </a:rPr>
+                  <a:t> </a:t>
+                </a:r>
+              </a:p>
+            </p:txBody>
+          </p:sp>
+        </mc:Fallback>
+      </mc:AlternateContent>
+      <mc:AlternateContent xmlns:mc="http://schemas.openxmlformats.org/markup-compatibility/2006">
+        <mc:Choice xmlns:a14="http://schemas.microsoft.com/office/drawing/2010/main" Requires="a14">
+          <p:sp>
+            <p:nvSpPr>
+              <p:cNvPr id="18" name="TextBox 17"/>
+              <p:cNvSpPr txBox="1"/>
+              <p:nvPr/>
+            </p:nvSpPr>
+            <p:spPr>
+              <a:xfrm>
+                <a:off x="10007806" y="1862049"/>
+                <a:ext cx="510268" cy="523220"/>
+              </a:xfrm>
+              <a:prstGeom prst="rect">
+                <a:avLst/>
+              </a:prstGeom>
+              <a:noFill/>
+            </p:spPr>
+            <p:txBody>
+              <a:bodyPr wrap="none" lIns="0" tIns="0" rIns="0" bIns="0" rtlCol="0">
+                <a:spAutoFit/>
+              </a:bodyPr>
+              <a:lstStyle/>
+              <a:p>
+                <a14:m>
+                  <m:oMathPara xmlns:m="http://schemas.openxmlformats.org/officeDocument/2006/math">
+                    <m:oMathParaPr>
+                      <m:jc m:val="centerGroup"/>
+                    </m:oMathParaPr>
+                    <m:oMath xmlns:m="http://schemas.openxmlformats.org/officeDocument/2006/math">
+                      <m:sSub>
+                        <m:sSubPr>
+                          <m:ctrlPr>
+                            <a:rPr lang="en-US" sz="3400" smtClean="0">
+                              <a:latin typeface="Cambria Math" panose="02040503050406030204" pitchFamily="18" charset="0"/>
+                            </a:rPr>
+                          </m:ctrlPr>
+                        </m:sSubPr>
+                        <m:e>
+                          <m:r>
+                            <a:rPr lang="en-US" sz="3400">
+                              <a:latin typeface="Cambria Math" panose="02040503050406030204" pitchFamily="18" charset="0"/>
+                            </a:rPr>
+                            <m:t>𝑆</m:t>
+                          </m:r>
+                        </m:e>
+                        <m:sub>
+                          <m:r>
+                            <a:rPr lang="en-US" sz="3400" b="0" i="0" smtClean="0">
+                              <a:latin typeface="Cambria Math" panose="02040503050406030204" pitchFamily="18" charset="0"/>
+                            </a:rPr>
+                            <m:t>2</m:t>
+                          </m:r>
+                        </m:sub>
+                      </m:sSub>
+                    </m:oMath>
+                  </m:oMathPara>
+                </a14:m>
+                <a:endParaRPr lang="en-US" sz="3400" dirty="0">
+                  <a:latin typeface="Cambria Math" panose="02040503050406030204" pitchFamily="18" charset="0"/>
+                </a:endParaRPr>
+              </a:p>
+            </p:txBody>
+          </p:sp>
+        </mc:Choice>
+        <mc:Fallback>
+          <p:sp>
+            <p:nvSpPr>
+              <p:cNvPr id="18" name="TextBox 17"/>
+              <p:cNvSpPr txBox="1">
+                <a:spLocks noRot="1" noChangeAspect="1" noMove="1" noResize="1" noEditPoints="1" noAdjustHandles="1" noChangeArrowheads="1" noChangeShapeType="1" noTextEdit="1"/>
+              </p:cNvSpPr>
+              <p:nvPr/>
+            </p:nvSpPr>
+            <p:spPr>
+              <a:xfrm>
+                <a:off x="10007806" y="1862049"/>
+                <a:ext cx="510268" cy="523220"/>
+              </a:xfrm>
+              <a:prstGeom prst="rect">
+                <a:avLst/>
+              </a:prstGeom>
+              <a:blipFill>
+                <a:blip r:embed="rId10"/>
+                <a:stretch>
+                  <a:fillRect/>
+                </a:stretch>
+              </a:blipFill>
+            </p:spPr>
+            <p:txBody>
+              <a:bodyPr/>
+              <a:lstStyle/>
+              <a:p>
+                <a:r>
+                  <a:rPr lang="en-US">
+                    <a:noFill/>
+                  </a:rPr>
+                  <a:t> </a:t>
+                </a:r>
+              </a:p>
+            </p:txBody>
+          </p:sp>
+        </mc:Fallback>
+      </mc:AlternateContent>
+      <mc:AlternateContent xmlns:mc="http://schemas.openxmlformats.org/markup-compatibility/2006">
+        <mc:Choice xmlns:a14="http://schemas.microsoft.com/office/drawing/2010/main" Requires="a14">
+          <p:sp>
+            <p:nvSpPr>
+              <p:cNvPr id="19" name="TextBox 18"/>
+              <p:cNvSpPr txBox="1"/>
+              <p:nvPr/>
+            </p:nvSpPr>
+            <p:spPr>
+              <a:xfrm>
+                <a:off x="10007806" y="4189487"/>
+                <a:ext cx="510268" cy="523220"/>
+              </a:xfrm>
+              <a:prstGeom prst="rect">
+                <a:avLst/>
+              </a:prstGeom>
+              <a:noFill/>
+            </p:spPr>
+            <p:txBody>
+              <a:bodyPr wrap="none" lIns="0" tIns="0" rIns="0" bIns="0" rtlCol="0">
+                <a:spAutoFit/>
+              </a:bodyPr>
+              <a:lstStyle/>
+              <a:p>
+                <a14:m>
+                  <m:oMathPara xmlns:m="http://schemas.openxmlformats.org/officeDocument/2006/math">
+                    <m:oMathParaPr>
+                      <m:jc m:val="centerGroup"/>
+                    </m:oMathParaPr>
+                    <m:oMath xmlns:m="http://schemas.openxmlformats.org/officeDocument/2006/math">
+                      <m:sSub>
+                        <m:sSubPr>
+                          <m:ctrlPr>
+                            <a:rPr lang="en-US" sz="3400" smtClean="0">
+                              <a:latin typeface="Cambria Math" panose="02040503050406030204" pitchFamily="18" charset="0"/>
+                            </a:rPr>
+                          </m:ctrlPr>
+                        </m:sSubPr>
+                        <m:e>
+                          <m:r>
+                            <a:rPr lang="en-US" sz="3400">
+                              <a:latin typeface="Cambria Math" panose="02040503050406030204" pitchFamily="18" charset="0"/>
+                            </a:rPr>
+                            <m:t>𝑆</m:t>
+                          </m:r>
+                        </m:e>
+                        <m:sub>
+                          <m:r>
+                            <a:rPr lang="en-US" sz="3400" b="0" i="0" smtClean="0">
+                              <a:latin typeface="Cambria Math" panose="02040503050406030204" pitchFamily="18" charset="0"/>
+                            </a:rPr>
+                            <m:t>3</m:t>
+                          </m:r>
+                        </m:sub>
+                      </m:sSub>
+                    </m:oMath>
+                  </m:oMathPara>
+                </a14:m>
+                <a:endParaRPr lang="en-US" sz="3400" dirty="0">
+                  <a:latin typeface="Cambria Math" panose="02040503050406030204" pitchFamily="18" charset="0"/>
+                </a:endParaRPr>
+              </a:p>
+            </p:txBody>
+          </p:sp>
+        </mc:Choice>
+        <mc:Fallback>
+          <p:sp>
+            <p:nvSpPr>
+              <p:cNvPr id="19" name="TextBox 18"/>
+              <p:cNvSpPr txBox="1">
+                <a:spLocks noRot="1" noChangeAspect="1" noMove="1" noResize="1" noEditPoints="1" noAdjustHandles="1" noChangeArrowheads="1" noChangeShapeType="1" noTextEdit="1"/>
+              </p:cNvSpPr>
+              <p:nvPr/>
+            </p:nvSpPr>
+            <p:spPr>
+              <a:xfrm>
+                <a:off x="10007806" y="4189487"/>
+                <a:ext cx="510268" cy="523220"/>
+              </a:xfrm>
+              <a:prstGeom prst="rect">
+                <a:avLst/>
+              </a:prstGeom>
+              <a:blipFill>
+                <a:blip r:embed="rId11"/>
+                <a:stretch>
+                  <a:fillRect/>
+                </a:stretch>
+              </a:blipFill>
+            </p:spPr>
+            <p:txBody>
+              <a:bodyPr/>
+              <a:lstStyle/>
+              <a:p>
+                <a:r>
+                  <a:rPr lang="en-US">
+                    <a:noFill/>
+                  </a:rPr>
+                  <a:t> </a:t>
+                </a:r>
+              </a:p>
+            </p:txBody>
+          </p:sp>
+        </mc:Fallback>
+      </mc:AlternateContent>
     </p:spTree>
     <p:extLst>
       <p:ext uri="{BB962C8B-B14F-4D97-AF65-F5344CB8AC3E}">

</xml_diff>